<commit_message>
updated the how to run slide
</commit_message>
<xml_diff>
--- a/NSW_TRIP_PLANNER.pptx
+++ b/NSW_TRIP_PLANNER.pptx
@@ -108,6 +108,11 @@
       </a:defRPr>
     </a:lvl9pPr>
   </p:defaultTextStyle>
+  <p:extLst>
+    <p:ext uri="{EFAFB233-063F-42B5-8137-9DF3F51BA10A}">
+      <p15:sldGuideLst xmlns:p15="http://schemas.microsoft.com/office/powerpoint/2012/main"/>
+    </p:ext>
+  </p:extLst>
 </p:presentation>
 </file>
 
@@ -3590,7 +3595,7 @@
         <p:spPr/>
         <p:txBody>
           <a:bodyPr>
-            <a:normAutofit lnSpcReduction="10000"/>
+            <a:normAutofit fontScale="85000" lnSpcReduction="20000"/>
           </a:bodyPr>
           <a:lstStyle/>
           <a:p>
@@ -3636,6 +3641,25 @@
             <a:r>
               <a:rPr lang="en-US" b="1" dirty="0"/>
               <a:t>npm update</a:t>
+            </a:r>
+          </a:p>
+          <a:p>
+            <a:r>
+              <a:rPr lang="en-US" dirty="0"/>
+              <a:t>C:\path\to\my\folder&gt;</a:t>
+            </a:r>
+            <a:r>
+              <a:rPr lang="en-US" b="1" dirty="0"/>
+              <a:t>webdriver-manager start</a:t>
+            </a:r>
+          </a:p>
+          <a:p>
+            <a:pPr marL="0" indent="0">
+              <a:buNone/>
+            </a:pPr>
+            <a:r>
+              <a:rPr lang="en-US" dirty="0"/>
+              <a:t>(make sure it says ‘Selenium Server is up and running’ in the end. Do not close this window)	</a:t>
             </a:r>
           </a:p>
           <a:p>

</xml_diff>

<commit_message>
added a thank you slide
</commit_message>
<xml_diff>
--- a/NSW_TRIP_PLANNER.pptx
+++ b/NSW_TRIP_PLANNER.pptx
@@ -10,6 +10,7 @@
     <p:sldId id="258" r:id="rId4"/>
     <p:sldId id="259" r:id="rId5"/>
     <p:sldId id="260" r:id="rId6"/>
+    <p:sldId id="261" r:id="rId7"/>
   </p:sldIdLst>
   <p:sldSz cx="12192000" cy="6858000"/>
   <p:notesSz cx="6858000" cy="9144000"/>
@@ -267,7 +268,7 @@
           <a:p>
             <a:fld id="{A68B5361-7D06-4040-8DD5-C38556E09FD5}" type="datetimeFigureOut">
               <a:rPr lang="en-US" smtClean="0"/>
-              <a:t>11/27/2017</a:t>
+              <a:t>11/28/2017</a:t>
             </a:fld>
             <a:endParaRPr lang="en-US"/>
           </a:p>
@@ -465,7 +466,7 @@
           <a:p>
             <a:fld id="{A68B5361-7D06-4040-8DD5-C38556E09FD5}" type="datetimeFigureOut">
               <a:rPr lang="en-US" smtClean="0"/>
-              <a:t>11/27/2017</a:t>
+              <a:t>11/28/2017</a:t>
             </a:fld>
             <a:endParaRPr lang="en-US"/>
           </a:p>
@@ -673,7 +674,7 @@
           <a:p>
             <a:fld id="{A68B5361-7D06-4040-8DD5-C38556E09FD5}" type="datetimeFigureOut">
               <a:rPr lang="en-US" smtClean="0"/>
-              <a:t>11/27/2017</a:t>
+              <a:t>11/28/2017</a:t>
             </a:fld>
             <a:endParaRPr lang="en-US"/>
           </a:p>
@@ -871,7 +872,7 @@
           <a:p>
             <a:fld id="{A68B5361-7D06-4040-8DD5-C38556E09FD5}" type="datetimeFigureOut">
               <a:rPr lang="en-US" smtClean="0"/>
-              <a:t>11/27/2017</a:t>
+              <a:t>11/28/2017</a:t>
             </a:fld>
             <a:endParaRPr lang="en-US"/>
           </a:p>
@@ -1146,7 +1147,7 @@
           <a:p>
             <a:fld id="{A68B5361-7D06-4040-8DD5-C38556E09FD5}" type="datetimeFigureOut">
               <a:rPr lang="en-US" smtClean="0"/>
-              <a:t>11/27/2017</a:t>
+              <a:t>11/28/2017</a:t>
             </a:fld>
             <a:endParaRPr lang="en-US"/>
           </a:p>
@@ -1411,7 +1412,7 @@
           <a:p>
             <a:fld id="{A68B5361-7D06-4040-8DD5-C38556E09FD5}" type="datetimeFigureOut">
               <a:rPr lang="en-US" smtClean="0"/>
-              <a:t>11/27/2017</a:t>
+              <a:t>11/28/2017</a:t>
             </a:fld>
             <a:endParaRPr lang="en-US"/>
           </a:p>
@@ -1823,7 +1824,7 @@
           <a:p>
             <a:fld id="{A68B5361-7D06-4040-8DD5-C38556E09FD5}" type="datetimeFigureOut">
               <a:rPr lang="en-US" smtClean="0"/>
-              <a:t>11/27/2017</a:t>
+              <a:t>11/28/2017</a:t>
             </a:fld>
             <a:endParaRPr lang="en-US"/>
           </a:p>
@@ -1964,7 +1965,7 @@
           <a:p>
             <a:fld id="{A68B5361-7D06-4040-8DD5-C38556E09FD5}" type="datetimeFigureOut">
               <a:rPr lang="en-US" smtClean="0"/>
-              <a:t>11/27/2017</a:t>
+              <a:t>11/28/2017</a:t>
             </a:fld>
             <a:endParaRPr lang="en-US"/>
           </a:p>
@@ -2077,7 +2078,7 @@
           <a:p>
             <a:fld id="{A68B5361-7D06-4040-8DD5-C38556E09FD5}" type="datetimeFigureOut">
               <a:rPr lang="en-US" smtClean="0"/>
-              <a:t>11/27/2017</a:t>
+              <a:t>11/28/2017</a:t>
             </a:fld>
             <a:endParaRPr lang="en-US"/>
           </a:p>
@@ -2388,7 +2389,7 @@
           <a:p>
             <a:fld id="{A68B5361-7D06-4040-8DD5-C38556E09FD5}" type="datetimeFigureOut">
               <a:rPr lang="en-US" smtClean="0"/>
-              <a:t>11/27/2017</a:t>
+              <a:t>11/28/2017</a:t>
             </a:fld>
             <a:endParaRPr lang="en-US"/>
           </a:p>
@@ -2676,7 +2677,7 @@
           <a:p>
             <a:fld id="{A68B5361-7D06-4040-8DD5-C38556E09FD5}" type="datetimeFigureOut">
               <a:rPr lang="en-US" smtClean="0"/>
-              <a:t>11/27/2017</a:t>
+              <a:t>11/28/2017</a:t>
             </a:fld>
             <a:endParaRPr lang="en-US"/>
           </a:p>
@@ -2917,7 +2918,7 @@
           <a:p>
             <a:fld id="{A68B5361-7D06-4040-8DD5-C38556E09FD5}" type="datetimeFigureOut">
               <a:rPr lang="en-US" smtClean="0"/>
-              <a:t>11/27/2017</a:t>
+              <a:t>11/28/2017</a:t>
             </a:fld>
             <a:endParaRPr lang="en-US"/>
           </a:p>
@@ -4007,6 +4008,98 @@
 </p:sld>
 </file>
 
+<file path=ppt/slides/slide6.xml><?xml version="1.0" encoding="utf-8"?>
+<p:sld xmlns:a="http://schemas.openxmlformats.org/drawingml/2006/main" xmlns:r="http://schemas.openxmlformats.org/officeDocument/2006/relationships" xmlns:p="http://schemas.openxmlformats.org/presentationml/2006/main">
+  <p:cSld>
+    <p:spTree>
+      <p:nvGrpSpPr>
+        <p:cNvPr id="1" name=""/>
+        <p:cNvGrpSpPr/>
+        <p:nvPr/>
+      </p:nvGrpSpPr>
+      <p:grpSpPr>
+        <a:xfrm>
+          <a:off x="0" y="0"/>
+          <a:ext cx="0" cy="0"/>
+          <a:chOff x="0" y="0"/>
+          <a:chExt cx="0" cy="0"/>
+        </a:xfrm>
+      </p:grpSpPr>
+      <p:sp>
+        <p:nvSpPr>
+          <p:cNvPr id="2" name="Title 1">
+            <a:extLst>
+              <a:ext uri="{FF2B5EF4-FFF2-40B4-BE49-F238E27FC236}">
+                <a16:creationId xmlns:a16="http://schemas.microsoft.com/office/drawing/2014/main" id="{F0A2B3A6-E851-463E-9A31-E942A6949819}"/>
+              </a:ext>
+            </a:extLst>
+          </p:cNvPr>
+          <p:cNvSpPr>
+            <a:spLocks noGrp="1"/>
+          </p:cNvSpPr>
+          <p:nvPr>
+            <p:ph type="title"/>
+          </p:nvPr>
+        </p:nvSpPr>
+        <p:spPr/>
+        <p:txBody>
+          <a:bodyPr/>
+          <a:lstStyle/>
+          <a:p>
+            <a:endParaRPr lang="en-US" dirty="0"/>
+          </a:p>
+        </p:txBody>
+      </p:sp>
+      <p:sp>
+        <p:nvSpPr>
+          <p:cNvPr id="3" name="Content Placeholder 2">
+            <a:extLst>
+              <a:ext uri="{FF2B5EF4-FFF2-40B4-BE49-F238E27FC236}">
+                <a16:creationId xmlns:a16="http://schemas.microsoft.com/office/drawing/2014/main" id="{6B346474-B44A-4DBE-9D0E-56EF193BAAB6}"/>
+              </a:ext>
+            </a:extLst>
+          </p:cNvPr>
+          <p:cNvSpPr>
+            <a:spLocks noGrp="1"/>
+          </p:cNvSpPr>
+          <p:nvPr>
+            <p:ph idx="1"/>
+          </p:nvPr>
+        </p:nvSpPr>
+        <p:spPr/>
+        <p:txBody>
+          <a:bodyPr>
+            <a:normAutofit/>
+          </a:bodyPr>
+          <a:lstStyle/>
+          <a:p>
+            <a:pPr marL="0" indent="0">
+              <a:buNone/>
+            </a:pPr>
+            <a:r>
+              <a:rPr lang="en-US" sz="4400" b="1"/>
+              <a:t>				Thank </a:t>
+            </a:r>
+            <a:r>
+              <a:rPr lang="en-US" sz="4400" b="1" dirty="0"/>
+              <a:t>You!</a:t>
+            </a:r>
+          </a:p>
+        </p:txBody>
+      </p:sp>
+    </p:spTree>
+    <p:extLst>
+      <p:ext uri="{BB962C8B-B14F-4D97-AF65-F5344CB8AC3E}">
+        <p14:creationId xmlns:p14="http://schemas.microsoft.com/office/powerpoint/2010/main" val="276582321"/>
+      </p:ext>
+    </p:extLst>
+  </p:cSld>
+  <p:clrMapOvr>
+    <a:masterClrMapping/>
+  </p:clrMapOvr>
+</p:sld>
+</file>
+
 <file path=ppt/theme/theme1.xml><?xml version="1.0" encoding="utf-8"?>
 <a:theme xmlns:a="http://schemas.openxmlformats.org/drawingml/2006/main" name="Office Theme">
   <a:themeElements>

</xml_diff>